<commit_message>
Modification de la dimension temps
Modification de la dimension temps
> MAJ du script de création du DWH
> MAJ du script de remplissage du DWH
> MAJ de la doc de conception
> Projet SSDT du cube avec hierarchie
</commit_message>
<xml_diff>
--- a/Documentation/3 - Documentation technique/Creation_CubeOLAP.pptx
+++ b/Documentation/3 - Documentation technique/Creation_CubeOLAP.pptx
@@ -121,7 +121,7 @@
   </p:defaultTextStyle>
   <p:extLst>
     <p:ext uri="{EFAFB233-063F-42B5-8137-9DF3F51BA10A}">
-      <p15:sldGuideLst xmlns:p15="http://schemas.microsoft.com/office/powerpoint/2012/main" xmlns="">
+      <p15:sldGuideLst xmlns:p15="http://schemas.microsoft.com/office/powerpoint/2012/main">
         <p15:guide id="1" orient="horz" pos="2160">
           <p15:clr>
             <a:srgbClr val="A4A3A4"/>
@@ -221,7 +221,7 @@
             <a:fld id="{E52630F6-BB7E-4BB0-B3A1-C739EB574077}" type="datetimeFigureOut">
               <a:rPr lang="fr-FR" smtClean="0"/>
               <a:pPr/>
-              <a:t>23/07/2015</a:t>
+              <a:t>04/08/2015</a:t>
             </a:fld>
             <a:endParaRPr lang="fr-FR"/>
           </a:p>
@@ -390,7 +390,7 @@
     </p:spTree>
     <p:extLst>
       <p:ext uri="{BB962C8B-B14F-4D97-AF65-F5344CB8AC3E}">
-        <p14:creationId xmlns:p14="http://schemas.microsoft.com/office/powerpoint/2010/main" xmlns="" val="644369615"/>
+        <p14:creationId xmlns:p14="http://schemas.microsoft.com/office/powerpoint/2010/main" val="644369615"/>
       </p:ext>
     </p:extLst>
   </p:cSld>
@@ -565,7 +565,7 @@
     </p:spTree>
     <p:extLst>
       <p:ext uri="{BB962C8B-B14F-4D97-AF65-F5344CB8AC3E}">
-        <p14:creationId xmlns:p14="http://schemas.microsoft.com/office/powerpoint/2010/main" xmlns="" val="447969412"/>
+        <p14:creationId xmlns:p14="http://schemas.microsoft.com/office/powerpoint/2010/main" val="447969412"/>
       </p:ext>
     </p:extLst>
   </p:cSld>
@@ -650,7 +650,7 @@
     </p:spTree>
     <p:extLst>
       <p:ext uri="{BB962C8B-B14F-4D97-AF65-F5344CB8AC3E}">
-        <p14:creationId xmlns:p14="http://schemas.microsoft.com/office/powerpoint/2010/main" xmlns="" val="447969412"/>
+        <p14:creationId xmlns:p14="http://schemas.microsoft.com/office/powerpoint/2010/main" val="447969412"/>
       </p:ext>
     </p:extLst>
   </p:cSld>
@@ -735,7 +735,7 @@
     </p:spTree>
     <p:extLst>
       <p:ext uri="{BB962C8B-B14F-4D97-AF65-F5344CB8AC3E}">
-        <p14:creationId xmlns:p14="http://schemas.microsoft.com/office/powerpoint/2010/main" xmlns="" val="447969412"/>
+        <p14:creationId xmlns:p14="http://schemas.microsoft.com/office/powerpoint/2010/main" val="447969412"/>
       </p:ext>
     </p:extLst>
   </p:cSld>
@@ -820,7 +820,7 @@
     </p:spTree>
     <p:extLst>
       <p:ext uri="{BB962C8B-B14F-4D97-AF65-F5344CB8AC3E}">
-        <p14:creationId xmlns:p14="http://schemas.microsoft.com/office/powerpoint/2010/main" xmlns="" val="447969412"/>
+        <p14:creationId xmlns:p14="http://schemas.microsoft.com/office/powerpoint/2010/main" val="447969412"/>
       </p:ext>
     </p:extLst>
   </p:cSld>
@@ -905,7 +905,7 @@
     </p:spTree>
     <p:extLst>
       <p:ext uri="{BB962C8B-B14F-4D97-AF65-F5344CB8AC3E}">
-        <p14:creationId xmlns:p14="http://schemas.microsoft.com/office/powerpoint/2010/main" xmlns="" val="447969412"/>
+        <p14:creationId xmlns:p14="http://schemas.microsoft.com/office/powerpoint/2010/main" val="447969412"/>
       </p:ext>
     </p:extLst>
   </p:cSld>
@@ -990,7 +990,7 @@
     </p:spTree>
     <p:extLst>
       <p:ext uri="{BB962C8B-B14F-4D97-AF65-F5344CB8AC3E}">
-        <p14:creationId xmlns:p14="http://schemas.microsoft.com/office/powerpoint/2010/main" xmlns="" val="447969412"/>
+        <p14:creationId xmlns:p14="http://schemas.microsoft.com/office/powerpoint/2010/main" val="447969412"/>
       </p:ext>
     </p:extLst>
   </p:cSld>
@@ -1075,7 +1075,7 @@
     </p:spTree>
     <p:extLst>
       <p:ext uri="{BB962C8B-B14F-4D97-AF65-F5344CB8AC3E}">
-        <p14:creationId xmlns:p14="http://schemas.microsoft.com/office/powerpoint/2010/main" xmlns="" val="447969412"/>
+        <p14:creationId xmlns:p14="http://schemas.microsoft.com/office/powerpoint/2010/main" val="447969412"/>
       </p:ext>
     </p:extLst>
   </p:cSld>
@@ -1160,7 +1160,7 @@
     </p:spTree>
     <p:extLst>
       <p:ext uri="{BB962C8B-B14F-4D97-AF65-F5344CB8AC3E}">
-        <p14:creationId xmlns:p14="http://schemas.microsoft.com/office/powerpoint/2010/main" xmlns="" val="447969412"/>
+        <p14:creationId xmlns:p14="http://schemas.microsoft.com/office/powerpoint/2010/main" val="447969412"/>
       </p:ext>
     </p:extLst>
   </p:cSld>
@@ -1278,6 +1278,11 @@
         </p:txBody>
       </p:sp>
     </p:spTree>
+    <p:extLst>
+      <p:ext uri="{BB962C8B-B14F-4D97-AF65-F5344CB8AC3E}">
+        <p14:creationId xmlns:p14="http://schemas.microsoft.com/office/powerpoint/2010/main" val="1139799262"/>
+      </p:ext>
+    </p:extLst>
   </p:cSld>
   <p:clrMapOvr>
     <a:masterClrMapping/>
@@ -1360,7 +1365,7 @@
     </p:spTree>
     <p:extLst>
       <p:ext uri="{BB962C8B-B14F-4D97-AF65-F5344CB8AC3E}">
-        <p14:creationId xmlns:p14="http://schemas.microsoft.com/office/powerpoint/2010/main" xmlns="" val="447969412"/>
+        <p14:creationId xmlns:p14="http://schemas.microsoft.com/office/powerpoint/2010/main" val="447969412"/>
       </p:ext>
     </p:extLst>
   </p:cSld>
@@ -1445,7 +1450,7 @@
     </p:spTree>
     <p:extLst>
       <p:ext uri="{BB962C8B-B14F-4D97-AF65-F5344CB8AC3E}">
-        <p14:creationId xmlns:p14="http://schemas.microsoft.com/office/powerpoint/2010/main" xmlns="" val="447969412"/>
+        <p14:creationId xmlns:p14="http://schemas.microsoft.com/office/powerpoint/2010/main" val="447969412"/>
       </p:ext>
     </p:extLst>
   </p:cSld>
@@ -1530,7 +1535,7 @@
     </p:spTree>
     <p:extLst>
       <p:ext uri="{BB962C8B-B14F-4D97-AF65-F5344CB8AC3E}">
-        <p14:creationId xmlns:p14="http://schemas.microsoft.com/office/powerpoint/2010/main" xmlns="" val="447969412"/>
+        <p14:creationId xmlns:p14="http://schemas.microsoft.com/office/powerpoint/2010/main" val="447969412"/>
       </p:ext>
     </p:extLst>
   </p:cSld>
@@ -1615,7 +1620,7 @@
     </p:spTree>
     <p:extLst>
       <p:ext uri="{BB962C8B-B14F-4D97-AF65-F5344CB8AC3E}">
-        <p14:creationId xmlns:p14="http://schemas.microsoft.com/office/powerpoint/2010/main" xmlns="" val="447969412"/>
+        <p14:creationId xmlns:p14="http://schemas.microsoft.com/office/powerpoint/2010/main" val="447969412"/>
       </p:ext>
     </p:extLst>
   </p:cSld>
@@ -1654,7 +1659,7 @@
           <a:blip r:embed="rId2" cstate="email">
             <a:extLst>
               <a:ext uri="{28A0092B-C50C-407E-A947-70E740481C1C}">
-                <a14:useLocalDpi xmlns:a14="http://schemas.microsoft.com/office/drawing/2010/main" xmlns="" val="0"/>
+                <a14:useLocalDpi xmlns:a14="http://schemas.microsoft.com/office/drawing/2010/main" val="0"/>
               </a:ext>
             </a:extLst>
           </a:blip>
@@ -1677,14 +1682,14 @@
           </a:ln>
           <a:extLst>
             <a:ext uri="{909E8E84-426E-40DD-AFC4-6F175D3DCCD1}">
-              <a14:hiddenFill xmlns:a14="http://schemas.microsoft.com/office/drawing/2010/main" xmlns="">
+              <a14:hiddenFill xmlns:a14="http://schemas.microsoft.com/office/drawing/2010/main">
                 <a:solidFill>
                   <a:schemeClr val="accent1"/>
                 </a:solidFill>
               </a14:hiddenFill>
             </a:ext>
             <a:ext uri="{91240B29-F687-4F45-9708-019B960494DF}">
-              <a14:hiddenLine xmlns:a14="http://schemas.microsoft.com/office/drawing/2010/main" xmlns="" w="9525">
+              <a14:hiddenLine xmlns:a14="http://schemas.microsoft.com/office/drawing/2010/main" w="9525">
                 <a:solidFill>
                   <a:schemeClr val="tx1"/>
                 </a:solidFill>
@@ -1820,7 +1825,7 @@
                 </a:solidFill>
               </a:rPr>
               <a:pPr/>
-              <a:t>23/07/2015</a:t>
+              <a:t>04/08/2015</a:t>
             </a:fld>
             <a:endParaRPr lang="fr-FR" b="1" dirty="0">
               <a:solidFill>
@@ -1967,7 +1972,7 @@
     </p:spTree>
     <p:extLst>
       <p:ext uri="{BB962C8B-B14F-4D97-AF65-F5344CB8AC3E}">
-        <p14:creationId xmlns:p14="http://schemas.microsoft.com/office/powerpoint/2010/main" xmlns="" val="2439187425"/>
+        <p14:creationId xmlns:p14="http://schemas.microsoft.com/office/powerpoint/2010/main" val="2439187425"/>
       </p:ext>
     </p:extLst>
   </p:cSld>
@@ -2094,7 +2099,7 @@
             <a:fld id="{CE5A5207-E07B-4FCF-99F6-F8833A3BB3D7}" type="datetime1">
               <a:rPr lang="fr-FR" smtClean="0"/>
               <a:pPr/>
-              <a:t>23/07/2015</a:t>
+              <a:t>04/08/2015</a:t>
             </a:fld>
             <a:endParaRPr lang="fr-FR"/>
           </a:p>
@@ -2146,7 +2151,7 @@
     </p:spTree>
     <p:extLst>
       <p:ext uri="{BB962C8B-B14F-4D97-AF65-F5344CB8AC3E}">
-        <p14:creationId xmlns:p14="http://schemas.microsoft.com/office/powerpoint/2010/main" xmlns="" val="2277311567"/>
+        <p14:creationId xmlns:p14="http://schemas.microsoft.com/office/powerpoint/2010/main" val="2277311567"/>
       </p:ext>
     </p:extLst>
   </p:cSld>
@@ -2276,7 +2281,7 @@
             <a:fld id="{D68965C6-0898-43EA-9A99-A4039BB22876}" type="datetime1">
               <a:rPr lang="fr-FR" smtClean="0"/>
               <a:pPr/>
-              <a:t>23/07/2015</a:t>
+              <a:t>04/08/2015</a:t>
             </a:fld>
             <a:endParaRPr lang="fr-FR"/>
           </a:p>
@@ -2328,7 +2333,7 @@
     </p:spTree>
     <p:extLst>
       <p:ext uri="{BB962C8B-B14F-4D97-AF65-F5344CB8AC3E}">
-        <p14:creationId xmlns:p14="http://schemas.microsoft.com/office/powerpoint/2010/main" xmlns="" val="1382734851"/>
+        <p14:creationId xmlns:p14="http://schemas.microsoft.com/office/powerpoint/2010/main" val="1382734851"/>
       </p:ext>
     </p:extLst>
   </p:cSld>
@@ -2448,7 +2453,7 @@
             <a:fld id="{94B2F636-2596-4D20-BE75-DC7667EB0908}" type="datetime1">
               <a:rPr lang="fr-FR" smtClean="0"/>
               <a:pPr/>
-              <a:t>23/07/2015</a:t>
+              <a:t>04/08/2015</a:t>
             </a:fld>
             <a:endParaRPr lang="fr-FR"/>
           </a:p>
@@ -2500,7 +2505,7 @@
     </p:spTree>
     <p:extLst>
       <p:ext uri="{BB962C8B-B14F-4D97-AF65-F5344CB8AC3E}">
-        <p14:creationId xmlns:p14="http://schemas.microsoft.com/office/powerpoint/2010/main" xmlns="" val="1730161274"/>
+        <p14:creationId xmlns:p14="http://schemas.microsoft.com/office/powerpoint/2010/main" val="1730161274"/>
       </p:ext>
     </p:extLst>
   </p:cSld>
@@ -2696,7 +2701,7 @@
             <a:fld id="{3941AF55-5B35-49D2-89B7-6A012C2F0023}" type="datetime1">
               <a:rPr lang="fr-FR" smtClean="0"/>
               <a:pPr/>
-              <a:t>23/07/2015</a:t>
+              <a:t>04/08/2015</a:t>
             </a:fld>
             <a:endParaRPr lang="fr-FR"/>
           </a:p>
@@ -2748,7 +2753,7 @@
     </p:spTree>
     <p:extLst>
       <p:ext uri="{BB962C8B-B14F-4D97-AF65-F5344CB8AC3E}">
-        <p14:creationId xmlns:p14="http://schemas.microsoft.com/office/powerpoint/2010/main" xmlns="" val="3623823994"/>
+        <p14:creationId xmlns:p14="http://schemas.microsoft.com/office/powerpoint/2010/main" val="3623823994"/>
       </p:ext>
     </p:extLst>
   </p:cSld>
@@ -2986,7 +2991,7 @@
             <a:fld id="{B36C4D42-2F73-4BB2-8416-8B3A3DDD3EE7}" type="datetime1">
               <a:rPr lang="fr-FR" smtClean="0"/>
               <a:pPr/>
-              <a:t>23/07/2015</a:t>
+              <a:t>04/08/2015</a:t>
             </a:fld>
             <a:endParaRPr lang="fr-FR"/>
           </a:p>
@@ -3038,7 +3043,7 @@
     </p:spTree>
     <p:extLst>
       <p:ext uri="{BB962C8B-B14F-4D97-AF65-F5344CB8AC3E}">
-        <p14:creationId xmlns:p14="http://schemas.microsoft.com/office/powerpoint/2010/main" xmlns="" val="2477640779"/>
+        <p14:creationId xmlns:p14="http://schemas.microsoft.com/office/powerpoint/2010/main" val="2477640779"/>
       </p:ext>
     </p:extLst>
   </p:cSld>
@@ -3410,7 +3415,7 @@
             <a:fld id="{E456F79D-CD5D-4224-B1FA-5F7F3BAA4104}" type="datetime1">
               <a:rPr lang="fr-FR" smtClean="0"/>
               <a:pPr/>
-              <a:t>23/07/2015</a:t>
+              <a:t>04/08/2015</a:t>
             </a:fld>
             <a:endParaRPr lang="fr-FR"/>
           </a:p>
@@ -3462,7 +3467,7 @@
     </p:spTree>
     <p:extLst>
       <p:ext uri="{BB962C8B-B14F-4D97-AF65-F5344CB8AC3E}">
-        <p14:creationId xmlns:p14="http://schemas.microsoft.com/office/powerpoint/2010/main" xmlns="" val="839060086"/>
+        <p14:creationId xmlns:p14="http://schemas.microsoft.com/office/powerpoint/2010/main" val="839060086"/>
       </p:ext>
     </p:extLst>
   </p:cSld>
@@ -3530,7 +3535,7 @@
             <a:fld id="{0E910143-4D2C-4FF6-B0A6-06989F9BDBAC}" type="datetime1">
               <a:rPr lang="fr-FR" smtClean="0"/>
               <a:pPr/>
-              <a:t>23/07/2015</a:t>
+              <a:t>04/08/2015</a:t>
             </a:fld>
             <a:endParaRPr lang="fr-FR"/>
           </a:p>
@@ -3582,7 +3587,7 @@
     </p:spTree>
     <p:extLst>
       <p:ext uri="{BB962C8B-B14F-4D97-AF65-F5344CB8AC3E}">
-        <p14:creationId xmlns:p14="http://schemas.microsoft.com/office/powerpoint/2010/main" xmlns="" val="2000422401"/>
+        <p14:creationId xmlns:p14="http://schemas.microsoft.com/office/powerpoint/2010/main" val="2000422401"/>
       </p:ext>
     </p:extLst>
   </p:cSld>
@@ -3627,7 +3632,7 @@
             <a:fld id="{1E0A4A73-C55A-4735-A06F-415E5CC28EBA}" type="datetime1">
               <a:rPr lang="fr-FR" smtClean="0"/>
               <a:pPr/>
-              <a:t>23/07/2015</a:t>
+              <a:t>04/08/2015</a:t>
             </a:fld>
             <a:endParaRPr lang="fr-FR"/>
           </a:p>
@@ -3679,7 +3684,7 @@
     </p:spTree>
     <p:extLst>
       <p:ext uri="{BB962C8B-B14F-4D97-AF65-F5344CB8AC3E}">
-        <p14:creationId xmlns:p14="http://schemas.microsoft.com/office/powerpoint/2010/main" xmlns="" val="1625092074"/>
+        <p14:creationId xmlns:p14="http://schemas.microsoft.com/office/powerpoint/2010/main" val="1625092074"/>
       </p:ext>
     </p:extLst>
   </p:cSld>
@@ -3906,7 +3911,7 @@
             <a:fld id="{B73FC597-E398-43B4-BDF9-08A9085F6959}" type="datetime1">
               <a:rPr lang="fr-FR" smtClean="0"/>
               <a:pPr/>
-              <a:t>23/07/2015</a:t>
+              <a:t>04/08/2015</a:t>
             </a:fld>
             <a:endParaRPr lang="fr-FR"/>
           </a:p>
@@ -3958,7 +3963,7 @@
     </p:spTree>
     <p:extLst>
       <p:ext uri="{BB962C8B-B14F-4D97-AF65-F5344CB8AC3E}">
-        <p14:creationId xmlns:p14="http://schemas.microsoft.com/office/powerpoint/2010/main" xmlns="" val="1562112021"/>
+        <p14:creationId xmlns:p14="http://schemas.microsoft.com/office/powerpoint/2010/main" val="1562112021"/>
       </p:ext>
     </p:extLst>
   </p:cSld>
@@ -4161,7 +4166,7 @@
             <a:fld id="{D6C9D74D-BD35-47D9-98F8-EE91FA02EBB2}" type="datetime1">
               <a:rPr lang="fr-FR" smtClean="0"/>
               <a:pPr/>
-              <a:t>23/07/2015</a:t>
+              <a:t>04/08/2015</a:t>
             </a:fld>
             <a:endParaRPr lang="fr-FR"/>
           </a:p>
@@ -4213,7 +4218,7 @@
     </p:spTree>
     <p:extLst>
       <p:ext uri="{BB962C8B-B14F-4D97-AF65-F5344CB8AC3E}">
-        <p14:creationId xmlns:p14="http://schemas.microsoft.com/office/powerpoint/2010/main" xmlns="" val="2251527463"/>
+        <p14:creationId xmlns:p14="http://schemas.microsoft.com/office/powerpoint/2010/main" val="2251527463"/>
       </p:ext>
     </p:extLst>
   </p:cSld>
@@ -4376,7 +4381,7 @@
             <a:fld id="{C8E6BC2D-0CAC-4C60-B0A8-88D3FE659C6F}" type="datetime1">
               <a:rPr lang="fr-FR" smtClean="0"/>
               <a:pPr/>
-              <a:t>23/07/2015</a:t>
+              <a:t>04/08/2015</a:t>
             </a:fld>
             <a:endParaRPr lang="fr-FR"/>
           </a:p>
@@ -4464,7 +4469,7 @@
     </p:spTree>
     <p:extLst>
       <p:ext uri="{BB962C8B-B14F-4D97-AF65-F5344CB8AC3E}">
-        <p14:creationId xmlns:p14="http://schemas.microsoft.com/office/powerpoint/2010/main" xmlns="" val="689816528"/>
+        <p14:creationId xmlns:p14="http://schemas.microsoft.com/office/powerpoint/2010/main" val="689816528"/>
       </p:ext>
     </p:extLst>
   </p:cSld>
@@ -4836,7 +4841,7 @@
           <a:blip r:embed="rId3" cstate="email">
             <a:extLst>
               <a:ext uri="{28A0092B-C50C-407E-A947-70E740481C1C}">
-                <a14:useLocalDpi xmlns:a14="http://schemas.microsoft.com/office/drawing/2010/main" xmlns="" val="0"/>
+                <a14:useLocalDpi xmlns:a14="http://schemas.microsoft.com/office/drawing/2010/main" val="0"/>
               </a:ext>
             </a:extLst>
           </a:blip>
@@ -4857,14 +4862,14 @@
           </a:ln>
           <a:extLst>
             <a:ext uri="{909E8E84-426E-40DD-AFC4-6F175D3DCCD1}">
-              <a14:hiddenFill xmlns:a14="http://schemas.microsoft.com/office/drawing/2010/main" xmlns="">
+              <a14:hiddenFill xmlns:a14="http://schemas.microsoft.com/office/drawing/2010/main">
                 <a:solidFill>
                   <a:schemeClr val="accent1"/>
                 </a:solidFill>
               </a14:hiddenFill>
             </a:ext>
             <a:ext uri="{91240B29-F687-4F45-9708-019B960494DF}">
-              <a14:hiddenLine xmlns:a14="http://schemas.microsoft.com/office/drawing/2010/main" xmlns="" w="9525">
+              <a14:hiddenLine xmlns:a14="http://schemas.microsoft.com/office/drawing/2010/main" w="9525">
                 <a:solidFill>
                   <a:schemeClr val="tx1"/>
                 </a:solidFill>
@@ -5009,7 +5014,7 @@
     </p:spTree>
     <p:extLst>
       <p:ext uri="{BB962C8B-B14F-4D97-AF65-F5344CB8AC3E}">
-        <p14:creationId xmlns:p14="http://schemas.microsoft.com/office/powerpoint/2010/main" xmlns="" val="3506473687"/>
+        <p14:creationId xmlns:p14="http://schemas.microsoft.com/office/powerpoint/2010/main" val="3506473687"/>
       </p:ext>
     </p:extLst>
   </p:cSld>
@@ -5211,7 +5216,7 @@
         <p:spPr>
           <a:xfrm>
             <a:off x="72000" y="548680"/>
-            <a:ext cx="9072000" cy="2883951"/>
+            <a:ext cx="9072000" cy="3165760"/>
           </a:xfrm>
           <a:custGeom>
             <a:avLst/>
@@ -5407,8 +5412,75 @@
                 <a:ea typeface="Microsoft YaHei" pitchFamily="2"/>
                 <a:cs typeface="Mangal" pitchFamily="2"/>
               </a:rPr>
-              <a:t>Studio (SSMS)</a:t>
-            </a:r>
+              <a:t>Studio (SSMS</a:t>
+            </a:r>
+            <a:r>
+              <a:rPr lang="fr-FR" sz="1800" b="1" i="0" u="none" strike="noStrike" kern="1200" spc="0" dirty="0" smtClean="0">
+                <a:ln>
+                  <a:noFill/>
+                </a:ln>
+                <a:solidFill>
+                  <a:srgbClr val="000000"/>
+                </a:solidFill>
+                <a:latin typeface="Calibri" pitchFamily="18"/>
+                <a:ea typeface="Microsoft YaHei" pitchFamily="2"/>
+                <a:cs typeface="Mangal" pitchFamily="2"/>
+              </a:rPr>
+              <a:t>) </a:t>
+            </a:r>
+            <a:r>
+              <a:rPr lang="fr-FR" sz="1800" i="0" u="none" strike="noStrike" kern="1200" spc="0" dirty="0" smtClean="0">
+                <a:ln>
+                  <a:noFill/>
+                </a:ln>
+                <a:solidFill>
+                  <a:srgbClr val="000000"/>
+                </a:solidFill>
+                <a:latin typeface="Calibri" pitchFamily="18"/>
+                <a:ea typeface="Microsoft YaHei" pitchFamily="2"/>
+                <a:cs typeface="Mangal" pitchFamily="2"/>
+              </a:rPr>
+              <a:t>en vous connectant sur la base</a:t>
+            </a:r>
+            <a:r>
+              <a:rPr lang="fr-FR" sz="1800" b="1" i="0" u="none" strike="noStrike" kern="1200" spc="0" dirty="0" smtClean="0">
+                <a:ln>
+                  <a:noFill/>
+                </a:ln>
+                <a:solidFill>
+                  <a:srgbClr val="000000"/>
+                </a:solidFill>
+                <a:latin typeface="Calibri" pitchFamily="18"/>
+                <a:ea typeface="Microsoft YaHei" pitchFamily="2"/>
+                <a:cs typeface="Mangal" pitchFamily="2"/>
+              </a:rPr>
+              <a:t> SQL SERVER du DWH </a:t>
+            </a:r>
+            <a:r>
+              <a:rPr lang="fr-FR" sz="1800" i="0" u="none" strike="noStrike" kern="1200" spc="0" dirty="0" smtClean="0">
+                <a:ln>
+                  <a:noFill/>
+                </a:ln>
+                <a:solidFill>
+                  <a:srgbClr val="000000"/>
+                </a:solidFill>
+                <a:latin typeface="Calibri" pitchFamily="18"/>
+                <a:ea typeface="Microsoft YaHei" pitchFamily="2"/>
+                <a:cs typeface="Mangal" pitchFamily="2"/>
+              </a:rPr>
+              <a:t>(Et non SSAS)</a:t>
+            </a:r>
+            <a:endParaRPr lang="fr-FR" sz="1800" i="0" u="none" strike="noStrike" kern="1200" spc="0" dirty="0" smtClean="0">
+              <a:ln>
+                <a:noFill/>
+              </a:ln>
+              <a:solidFill>
+                <a:srgbClr val="000000"/>
+              </a:solidFill>
+              <a:latin typeface="Calibri" pitchFamily="18"/>
+              <a:ea typeface="Microsoft YaHei" pitchFamily="2"/>
+              <a:cs typeface="Mangal" pitchFamily="2"/>
+            </a:endParaRPr>
           </a:p>
           <a:p>
             <a:pPr marL="0" marR="0" lvl="0" indent="0" algn="l" rtl="0" hangingPunct="1">
@@ -5582,7 +5654,7 @@
               <a:t>: </a:t>
             </a:r>
             <a:r>
-              <a:rPr lang="fr-FR" sz="1800" b="0" i="0" u="none" strike="noStrike" kern="1200" spc="0" dirty="0" err="1" smtClean="0">
+              <a:rPr lang="fr-FR" sz="1800" b="0" i="0" u="none" strike="noStrike" kern="1200" spc="0" dirty="0" smtClean="0">
                 <a:ln>
                   <a:noFill/>
                 </a:ln>
@@ -5593,7 +5665,7 @@
                 <a:ea typeface="Microsoft YaHei" pitchFamily="2"/>
                 <a:cs typeface="Mangal" pitchFamily="2"/>
               </a:rPr>
-              <a:t>Selectionez</a:t>
+              <a:t>Sélectionnez </a:t>
             </a:r>
             <a:r>
               <a:rPr lang="fr-FR" sz="1800" b="0" i="0" u="none" strike="noStrike" kern="1200" spc="0" dirty="0" smtClean="0">
@@ -5607,7 +5679,7 @@
                 <a:ea typeface="Microsoft YaHei" pitchFamily="2"/>
                 <a:cs typeface="Mangal" pitchFamily="2"/>
               </a:rPr>
-              <a:t> « Nouvelle connexion »</a:t>
+              <a:t>« Nouvelle connexion »</a:t>
             </a:r>
             <a:endParaRPr lang="fr-FR" sz="1800" b="0" i="0" u="none" strike="noStrike" kern="1200" spc="0" dirty="0">
               <a:ln>
@@ -6167,7 +6239,7 @@
     </p:spTree>
     <p:extLst>
       <p:ext uri="{BB962C8B-B14F-4D97-AF65-F5344CB8AC3E}">
-        <p14:creationId xmlns:p14="http://schemas.microsoft.com/office/powerpoint/2010/main" xmlns="" val="1451352722"/>
+        <p14:creationId xmlns:p14="http://schemas.microsoft.com/office/powerpoint/2010/main" val="1451352722"/>
       </p:ext>
     </p:extLst>
   </p:cSld>
@@ -7181,7 +7253,7 @@
     </p:spTree>
     <p:extLst>
       <p:ext uri="{BB962C8B-B14F-4D97-AF65-F5344CB8AC3E}">
-        <p14:creationId xmlns:p14="http://schemas.microsoft.com/office/powerpoint/2010/main" xmlns="" val="1451352722"/>
+        <p14:creationId xmlns:p14="http://schemas.microsoft.com/office/powerpoint/2010/main" val="1451352722"/>
       </p:ext>
     </p:extLst>
   </p:cSld>
@@ -7682,7 +7754,7 @@
                 <a:ea typeface="Microsoft YaHei" pitchFamily="2"/>
                 <a:cs typeface="Mangal" pitchFamily="2"/>
               </a:rPr>
-              <a:t>cube dans Visual </a:t>
+              <a:t>cube dans </a:t>
             </a:r>
             <a:r>
               <a:rPr lang="fr-FR" sz="1800" b="0" i="0" u="none" strike="noStrike" kern="1200" spc="0" dirty="0" smtClean="0">
@@ -7696,8 +7768,19 @@
                 <a:ea typeface="Microsoft YaHei" pitchFamily="2"/>
                 <a:cs typeface="Mangal" pitchFamily="2"/>
               </a:rPr>
-              <a:t>Studio</a:t>
-            </a:r>
+              <a:t>SSDT</a:t>
+            </a:r>
+            <a:endParaRPr lang="fr-FR" sz="1800" b="0" i="0" u="none" strike="noStrike" kern="1200" spc="0" dirty="0" smtClean="0">
+              <a:ln>
+                <a:noFill/>
+              </a:ln>
+              <a:solidFill>
+                <a:srgbClr val="000000"/>
+              </a:solidFill>
+              <a:latin typeface="Calibri" pitchFamily="18"/>
+              <a:ea typeface="Microsoft YaHei" pitchFamily="2"/>
+              <a:cs typeface="Mangal" pitchFamily="2"/>
+            </a:endParaRPr>
           </a:p>
           <a:p>
             <a:pPr marL="0" marR="0" lvl="0" indent="0" algn="l" rtl="0" hangingPunct="1">
@@ -8089,7 +8172,7 @@
     </p:spTree>
     <p:extLst>
       <p:ext uri="{BB962C8B-B14F-4D97-AF65-F5344CB8AC3E}">
-        <p14:creationId xmlns:p14="http://schemas.microsoft.com/office/powerpoint/2010/main" xmlns="" val="1451352722"/>
+        <p14:creationId xmlns:p14="http://schemas.microsoft.com/office/powerpoint/2010/main" val="1451352722"/>
       </p:ext>
     </p:extLst>
   </p:cSld>
@@ -8530,7 +8613,7 @@
     </p:spTree>
     <p:extLst>
       <p:ext uri="{BB962C8B-B14F-4D97-AF65-F5344CB8AC3E}">
-        <p14:creationId xmlns:p14="http://schemas.microsoft.com/office/powerpoint/2010/main" xmlns="" val="1451352722"/>
+        <p14:creationId xmlns:p14="http://schemas.microsoft.com/office/powerpoint/2010/main" val="1451352722"/>
       </p:ext>
     </p:extLst>
   </p:cSld>
@@ -8611,7 +8694,7 @@
     </p:spTree>
     <p:extLst>
       <p:ext uri="{BB962C8B-B14F-4D97-AF65-F5344CB8AC3E}">
-        <p14:creationId xmlns:p14="http://schemas.microsoft.com/office/powerpoint/2010/main" xmlns="" val="3949703253"/>
+        <p14:creationId xmlns:p14="http://schemas.microsoft.com/office/powerpoint/2010/main" val="3949703253"/>
       </p:ext>
     </p:extLst>
   </p:cSld>
@@ -9433,7 +9516,7 @@
     </p:spTree>
     <p:extLst>
       <p:ext uri="{BB962C8B-B14F-4D97-AF65-F5344CB8AC3E}">
-        <p14:creationId xmlns:p14="http://schemas.microsoft.com/office/powerpoint/2010/main" xmlns="" val="1451352722"/>
+        <p14:creationId xmlns:p14="http://schemas.microsoft.com/office/powerpoint/2010/main" val="1451352722"/>
       </p:ext>
     </p:extLst>
   </p:cSld>
@@ -10163,7 +10246,7 @@
     </p:spTree>
     <p:extLst>
       <p:ext uri="{BB962C8B-B14F-4D97-AF65-F5344CB8AC3E}">
-        <p14:creationId xmlns:p14="http://schemas.microsoft.com/office/powerpoint/2010/main" xmlns="" val="1451352722"/>
+        <p14:creationId xmlns:p14="http://schemas.microsoft.com/office/powerpoint/2010/main" val="1451352722"/>
       </p:ext>
     </p:extLst>
   </p:cSld>
@@ -11876,7 +11959,7 @@
         </p:nvSpPr>
         <p:spPr>
           <a:xfrm>
-            <a:off x="2491904" y="4039233"/>
+            <a:off x="2483312" y="4221088"/>
             <a:ext cx="1872208" cy="288032"/>
           </a:xfrm>
           <a:prstGeom prst="rect">
@@ -11918,9 +12001,9 @@
           <p:nvPr/>
         </p:nvCxnSpPr>
         <p:spPr>
-          <a:xfrm flipH="1">
-            <a:off x="2059856" y="4183249"/>
-            <a:ext cx="432048" cy="72008"/>
+          <a:xfrm flipH="1" flipV="1">
+            <a:off x="2059856" y="4255257"/>
+            <a:ext cx="423456" cy="109847"/>
           </a:xfrm>
           <a:prstGeom prst="straightConnector1">
             <a:avLst/>
@@ -12023,7 +12106,7 @@
     </p:spTree>
     <p:extLst>
       <p:ext uri="{BB962C8B-B14F-4D97-AF65-F5344CB8AC3E}">
-        <p14:creationId xmlns:p14="http://schemas.microsoft.com/office/powerpoint/2010/main" xmlns="" val="1451352722"/>
+        <p14:creationId xmlns:p14="http://schemas.microsoft.com/office/powerpoint/2010/main" val="1451352722"/>
       </p:ext>
     </p:extLst>
   </p:cSld>
@@ -12057,6 +12140,30 @@
           <a:chExt cx="0" cy="0"/>
         </a:xfrm>
       </p:grpSpPr>
+      <p:pic>
+        <p:nvPicPr>
+          <p:cNvPr id="3" name="Image 2"/>
+          <p:cNvPicPr>
+            <a:picLocks noChangeAspect="1"/>
+          </p:cNvPicPr>
+          <p:nvPr/>
+        </p:nvPicPr>
+        <p:blipFill>
+          <a:blip r:embed="rId3"/>
+          <a:stretch>
+            <a:fillRect/>
+          </a:stretch>
+        </p:blipFill>
+        <p:spPr>
+          <a:xfrm>
+            <a:off x="1893763" y="1916832"/>
+            <a:ext cx="4924425" cy="4438650"/>
+          </a:xfrm>
+          <a:prstGeom prst="rect">
+            <a:avLst/>
+          </a:prstGeom>
+        </p:spPr>
+      </p:pic>
       <p:sp>
         <p:nvSpPr>
           <p:cNvPr id="4" name="ZoneTexte 3"/>
@@ -12216,38 +12323,6 @@
           </a:p>
         </p:txBody>
       </p:sp>
-      <p:pic>
-        <p:nvPicPr>
-          <p:cNvPr id="7" name="Image 6"/>
-          <p:cNvPicPr>
-            <a:picLocks noChangeAspect="1"/>
-          </p:cNvPicPr>
-          <p:nvPr/>
-        </p:nvPicPr>
-        <p:blipFill>
-          <a:blip r:embed="rId3" cstate="screen">
-            <a:alphaModFix/>
-            <a:lum/>
-          </a:blip>
-          <a:srcRect/>
-          <a:stretch>
-            <a:fillRect/>
-          </a:stretch>
-        </p:blipFill>
-        <p:spPr>
-          <a:xfrm>
-            <a:off x="2376000" y="2232000"/>
-            <a:ext cx="3888000" cy="3816000"/>
-          </a:xfrm>
-          <a:prstGeom prst="rect">
-            <a:avLst/>
-          </a:prstGeom>
-          <a:noFill/>
-          <a:ln>
-            <a:noFill/>
-          </a:ln>
-        </p:spPr>
-      </p:pic>
       <p:sp>
         <p:nvSpPr>
           <p:cNvPr id="8" name="Rectangle 5"/>
@@ -12453,7 +12528,49 @@
                 <a:ea typeface="Microsoft YaHei" pitchFamily="2"/>
                 <a:cs typeface="Mangal" pitchFamily="2"/>
               </a:rPr>
-              <a:t>tables du DWH</a:t>
+              <a:t>tables du </a:t>
+            </a:r>
+            <a:r>
+              <a:rPr lang="fr-FR" sz="1800" b="0" i="0" u="none" strike="noStrike" kern="1200" spc="0" dirty="0" smtClean="0">
+                <a:ln>
+                  <a:noFill/>
+                </a:ln>
+                <a:solidFill>
+                  <a:srgbClr val="000000"/>
+                </a:solidFill>
+                <a:latin typeface="Calibri" pitchFamily="18"/>
+                <a:ea typeface="Microsoft YaHei" pitchFamily="2"/>
+                <a:cs typeface="Mangal" pitchFamily="2"/>
+              </a:rPr>
+              <a:t>DWH (Sauf </a:t>
+            </a:r>
+            <a:r>
+              <a:rPr lang="fr-FR" sz="1800" b="0" i="0" u="none" strike="noStrike" kern="1200" spc="0" dirty="0" err="1" smtClean="0">
+                <a:ln>
+                  <a:noFill/>
+                </a:ln>
+                <a:solidFill>
+                  <a:srgbClr val="000000"/>
+                </a:solidFill>
+                <a:latin typeface="Calibri" pitchFamily="18"/>
+                <a:ea typeface="Microsoft YaHei" pitchFamily="2"/>
+                <a:cs typeface="Mangal" pitchFamily="2"/>
+              </a:rPr>
+              <a:t>Database_Log</a:t>
+            </a:r>
+            <a:r>
+              <a:rPr lang="fr-FR" sz="1800" b="0" i="0" u="none" strike="noStrike" kern="1200" spc="0" dirty="0" smtClean="0">
+                <a:ln>
+                  <a:noFill/>
+                </a:ln>
+                <a:solidFill>
+                  <a:srgbClr val="000000"/>
+                </a:solidFill>
+                <a:latin typeface="Calibri" pitchFamily="18"/>
+                <a:ea typeface="Microsoft YaHei" pitchFamily="2"/>
+                <a:cs typeface="Mangal" pitchFamily="2"/>
+              </a:rPr>
+              <a:t>)</a:t>
             </a:r>
             <a:r>
               <a:rPr lang="fr-FR" sz="1800" b="0" i="0" u="none" strike="noStrike" kern="1200" spc="0" dirty="0">
@@ -12534,8 +12651,8 @@
         </p:nvSpPr>
         <p:spPr>
           <a:xfrm>
-            <a:off x="2555776" y="3573016"/>
-            <a:ext cx="1440160" cy="1512168"/>
+            <a:off x="2195736" y="3573016"/>
+            <a:ext cx="1800200" cy="1512168"/>
           </a:xfrm>
           <a:prstGeom prst="rect">
             <a:avLst/>
@@ -12650,7 +12767,7 @@
         </p:nvSpPr>
         <p:spPr>
           <a:xfrm>
-            <a:off x="4211960" y="5733256"/>
+            <a:off x="4283968" y="5949280"/>
             <a:ext cx="648072" cy="216024"/>
           </a:xfrm>
           <a:prstGeom prst="rect">
@@ -12694,7 +12811,7 @@
         <p:spPr>
           <a:xfrm>
             <a:off x="4355976" y="4725144"/>
-            <a:ext cx="180020" cy="1008112"/>
+            <a:ext cx="252028" cy="1224136"/>
           </a:xfrm>
           <a:prstGeom prst="straightConnector1">
             <a:avLst/>
@@ -12721,7 +12838,7 @@
     </p:spTree>
     <p:extLst>
       <p:ext uri="{BB962C8B-B14F-4D97-AF65-F5344CB8AC3E}">
-        <p14:creationId xmlns:p14="http://schemas.microsoft.com/office/powerpoint/2010/main" xmlns="" val="1451352722"/>
+        <p14:creationId xmlns:p14="http://schemas.microsoft.com/office/powerpoint/2010/main" val="1451352722"/>
       </p:ext>
     </p:extLst>
   </p:cSld>
@@ -13544,7 +13661,7 @@
     </p:spTree>
     <p:extLst>
       <p:ext uri="{BB962C8B-B14F-4D97-AF65-F5344CB8AC3E}">
-        <p14:creationId xmlns:p14="http://schemas.microsoft.com/office/powerpoint/2010/main" xmlns="" val="1451352722"/>
+        <p14:creationId xmlns:p14="http://schemas.microsoft.com/office/powerpoint/2010/main" val="1451352722"/>
       </p:ext>
     </p:extLst>
   </p:cSld>
@@ -14466,7 +14583,7 @@
     </p:spTree>
     <p:extLst>
       <p:ext uri="{BB962C8B-B14F-4D97-AF65-F5344CB8AC3E}">
-        <p14:creationId xmlns:p14="http://schemas.microsoft.com/office/powerpoint/2010/main" xmlns="" val="1451352722"/>
+        <p14:creationId xmlns:p14="http://schemas.microsoft.com/office/powerpoint/2010/main" val="1451352722"/>
       </p:ext>
     </p:extLst>
   </p:cSld>

</xml_diff>